<commit_message>
Update UI (change text to icon)
jmana only: remove redundant invisible images

change version: 2.0.9 -> 2.0.10
</commit_message>
<xml_diff>
--- a/dev-only/images.pptx
+++ b/dev-only/images.pptx
@@ -260,7 +260,7 @@
           <a:p>
             <a:fld id="{492CC70E-2C75-4B61-895B-57B864DBB07C}" type="datetimeFigureOut">
               <a:rPr lang="en-US" smtClean="0"/>
-              <a:t>1/14/2021</a:t>
+              <a:t>1/16/2021</a:t>
             </a:fld>
             <a:endParaRPr lang="en-US"/>
           </a:p>
@@ -458,7 +458,7 @@
           <a:p>
             <a:fld id="{492CC70E-2C75-4B61-895B-57B864DBB07C}" type="datetimeFigureOut">
               <a:rPr lang="en-US" smtClean="0"/>
-              <a:t>1/14/2021</a:t>
+              <a:t>1/16/2021</a:t>
             </a:fld>
             <a:endParaRPr lang="en-US"/>
           </a:p>
@@ -666,7 +666,7 @@
           <a:p>
             <a:fld id="{492CC70E-2C75-4B61-895B-57B864DBB07C}" type="datetimeFigureOut">
               <a:rPr lang="en-US" smtClean="0"/>
-              <a:t>1/14/2021</a:t>
+              <a:t>1/16/2021</a:t>
             </a:fld>
             <a:endParaRPr lang="en-US"/>
           </a:p>
@@ -864,7 +864,7 @@
           <a:p>
             <a:fld id="{492CC70E-2C75-4B61-895B-57B864DBB07C}" type="datetimeFigureOut">
               <a:rPr lang="en-US" smtClean="0"/>
-              <a:t>1/14/2021</a:t>
+              <a:t>1/16/2021</a:t>
             </a:fld>
             <a:endParaRPr lang="en-US"/>
           </a:p>
@@ -1139,7 +1139,7 @@
           <a:p>
             <a:fld id="{492CC70E-2C75-4B61-895B-57B864DBB07C}" type="datetimeFigureOut">
               <a:rPr lang="en-US" smtClean="0"/>
-              <a:t>1/14/2021</a:t>
+              <a:t>1/16/2021</a:t>
             </a:fld>
             <a:endParaRPr lang="en-US"/>
           </a:p>
@@ -1404,7 +1404,7 @@
           <a:p>
             <a:fld id="{492CC70E-2C75-4B61-895B-57B864DBB07C}" type="datetimeFigureOut">
               <a:rPr lang="en-US" smtClean="0"/>
-              <a:t>1/14/2021</a:t>
+              <a:t>1/16/2021</a:t>
             </a:fld>
             <a:endParaRPr lang="en-US"/>
           </a:p>
@@ -1816,7 +1816,7 @@
           <a:p>
             <a:fld id="{492CC70E-2C75-4B61-895B-57B864DBB07C}" type="datetimeFigureOut">
               <a:rPr lang="en-US" smtClean="0"/>
-              <a:t>1/14/2021</a:t>
+              <a:t>1/16/2021</a:t>
             </a:fld>
             <a:endParaRPr lang="en-US"/>
           </a:p>
@@ -1957,7 +1957,7 @@
           <a:p>
             <a:fld id="{492CC70E-2C75-4B61-895B-57B864DBB07C}" type="datetimeFigureOut">
               <a:rPr lang="en-US" smtClean="0"/>
-              <a:t>1/14/2021</a:t>
+              <a:t>1/16/2021</a:t>
             </a:fld>
             <a:endParaRPr lang="en-US"/>
           </a:p>
@@ -2070,7 +2070,7 @@
           <a:p>
             <a:fld id="{492CC70E-2C75-4B61-895B-57B864DBB07C}" type="datetimeFigureOut">
               <a:rPr lang="en-US" smtClean="0"/>
-              <a:t>1/14/2021</a:t>
+              <a:t>1/16/2021</a:t>
             </a:fld>
             <a:endParaRPr lang="en-US"/>
           </a:p>
@@ -2381,7 +2381,7 @@
           <a:p>
             <a:fld id="{492CC70E-2C75-4B61-895B-57B864DBB07C}" type="datetimeFigureOut">
               <a:rPr lang="en-US" smtClean="0"/>
-              <a:t>1/14/2021</a:t>
+              <a:t>1/16/2021</a:t>
             </a:fld>
             <a:endParaRPr lang="en-US"/>
           </a:p>
@@ -2669,7 +2669,7 @@
           <a:p>
             <a:fld id="{492CC70E-2C75-4B61-895B-57B864DBB07C}" type="datetimeFigureOut">
               <a:rPr lang="en-US" smtClean="0"/>
-              <a:t>1/14/2021</a:t>
+              <a:t>1/16/2021</a:t>
             </a:fld>
             <a:endParaRPr lang="en-US"/>
           </a:p>
@@ -2910,7 +2910,7 @@
           <a:p>
             <a:fld id="{492CC70E-2C75-4B61-895B-57B864DBB07C}" type="datetimeFigureOut">
               <a:rPr lang="en-US" smtClean="0"/>
-              <a:t>1/14/2021</a:t>
+              <a:t>1/16/2021</a:t>
             </a:fld>
             <a:endParaRPr lang="en-US"/>
           </a:p>
@@ -4077,7 +4077,7 @@
         </p:blipFill>
         <p:spPr>
           <a:xfrm>
-            <a:off x="6715946" y="1810553"/>
+            <a:off x="8950445" y="4276916"/>
             <a:ext cx="914400" cy="914400"/>
           </a:xfrm>
           <a:prstGeom prst="rect">
@@ -4116,7 +4116,7 @@
         </p:blipFill>
         <p:spPr>
           <a:xfrm>
-            <a:off x="7630346" y="1810553"/>
+            <a:off x="9864845" y="4276916"/>
             <a:ext cx="914400" cy="914400"/>
           </a:xfrm>
           <a:prstGeom prst="rect">
@@ -4155,7 +4155,7 @@
         </p:blipFill>
         <p:spPr>
           <a:xfrm>
-            <a:off x="8544746" y="1810553"/>
+            <a:off x="10779245" y="4276916"/>
             <a:ext cx="914400" cy="914400"/>
           </a:xfrm>
           <a:prstGeom prst="rect">
@@ -4194,7 +4194,7 @@
         </p:blipFill>
         <p:spPr>
           <a:xfrm>
-            <a:off x="6715946" y="2724953"/>
+            <a:off x="8950445" y="5191316"/>
             <a:ext cx="914400" cy="914400"/>
           </a:xfrm>
           <a:prstGeom prst="rect">
@@ -4233,7 +4233,7 @@
         </p:blipFill>
         <p:spPr>
           <a:xfrm>
-            <a:off x="7630346" y="2724953"/>
+            <a:off x="9864845" y="5191316"/>
             <a:ext cx="914400" cy="914400"/>
           </a:xfrm>
           <a:prstGeom prst="rect">
@@ -4272,7 +4272,7 @@
         </p:blipFill>
         <p:spPr>
           <a:xfrm>
-            <a:off x="8544746" y="2724953"/>
+            <a:off x="10779245" y="5191316"/>
             <a:ext cx="914400" cy="914400"/>
           </a:xfrm>
           <a:prstGeom prst="rect">
@@ -4363,7 +4363,7 @@
         </p:nvSpPr>
         <p:spPr>
           <a:xfrm>
-            <a:off x="5476055" y="2724953"/>
+            <a:off x="7710554" y="5191316"/>
             <a:ext cx="914400" cy="914400"/>
           </a:xfrm>
           <a:prstGeom prst="circularArrow">
@@ -4486,6 +4486,552 @@
           </a:fontRef>
         </p:style>
       </p:sp>
+      <p:pic>
+        <p:nvPicPr>
+          <p:cNvPr id="7" name="Graphic 6" descr="Folder outline">
+            <a:extLst>
+              <a:ext uri="{FF2B5EF4-FFF2-40B4-BE49-F238E27FC236}">
+                <a16:creationId xmlns:a16="http://schemas.microsoft.com/office/drawing/2014/main" id="{A4B6FC58-55A0-432D-96BF-8C148E2CEDB3}"/>
+              </a:ext>
+            </a:extLst>
+          </p:cNvPr>
+          <p:cNvPicPr>
+            <a:picLocks noChangeAspect="1"/>
+          </p:cNvPicPr>
+          <p:nvPr/>
+        </p:nvPicPr>
+        <p:blipFill>
+          <a:blip r:embed="rId22">
+            <a:extLst>
+              <a:ext uri="{28A0092B-C50C-407E-A947-70E740481C1C}">
+                <a14:useLocalDpi xmlns:a14="http://schemas.microsoft.com/office/drawing/2010/main" val="0"/>
+              </a:ext>
+              <a:ext uri="{96DAC541-7B7A-43D3-8B79-37D633B846F1}">
+                <asvg:svgBlip xmlns:asvg="http://schemas.microsoft.com/office/drawing/2016/SVG/main" r:embed="rId23"/>
+              </a:ext>
+            </a:extLst>
+          </a:blip>
+          <a:stretch>
+            <a:fillRect/>
+          </a:stretch>
+        </p:blipFill>
+        <p:spPr>
+          <a:xfrm>
+            <a:off x="6310247" y="4590248"/>
+            <a:ext cx="914400" cy="914400"/>
+          </a:xfrm>
+          <a:prstGeom prst="rect">
+            <a:avLst/>
+          </a:prstGeom>
+        </p:spPr>
+      </p:pic>
+      <p:pic>
+        <p:nvPicPr>
+          <p:cNvPr id="18" name="Graphic 17" descr="Folder outline">
+            <a:extLst>
+              <a:ext uri="{FF2B5EF4-FFF2-40B4-BE49-F238E27FC236}">
+                <a16:creationId xmlns:a16="http://schemas.microsoft.com/office/drawing/2014/main" id="{FC0767D3-1D17-40B0-9D4A-16406EFD9D13}"/>
+              </a:ext>
+            </a:extLst>
+          </p:cNvPr>
+          <p:cNvPicPr>
+            <a:picLocks noChangeAspect="1"/>
+          </p:cNvPicPr>
+          <p:nvPr/>
+        </p:nvPicPr>
+        <p:blipFill>
+          <a:blip r:embed="rId24">
+            <a:extLst>
+              <a:ext uri="{28A0092B-C50C-407E-A947-70E740481C1C}">
+                <a14:useLocalDpi xmlns:a14="http://schemas.microsoft.com/office/drawing/2010/main" val="0"/>
+              </a:ext>
+              <a:ext uri="{96DAC541-7B7A-43D3-8B79-37D633B846F1}">
+                <asvg:svgBlip xmlns:asvg="http://schemas.microsoft.com/office/drawing/2016/SVG/main" r:embed="rId25"/>
+              </a:ext>
+            </a:extLst>
+          </a:blip>
+          <a:stretch>
+            <a:fillRect/>
+          </a:stretch>
+        </p:blipFill>
+        <p:spPr>
+          <a:xfrm>
+            <a:off x="6310247" y="5504648"/>
+            <a:ext cx="914400" cy="914400"/>
+          </a:xfrm>
+          <a:prstGeom prst="rect">
+            <a:avLst/>
+          </a:prstGeom>
+        </p:spPr>
+      </p:pic>
+      <p:pic>
+        <p:nvPicPr>
+          <p:cNvPr id="19" name="Graphic 18" descr="Folder Search with solid fill">
+            <a:extLst>
+              <a:ext uri="{FF2B5EF4-FFF2-40B4-BE49-F238E27FC236}">
+                <a16:creationId xmlns:a16="http://schemas.microsoft.com/office/drawing/2014/main" id="{FEF25571-B617-4795-BAD5-77169D8F2D53}"/>
+              </a:ext>
+            </a:extLst>
+          </p:cNvPr>
+          <p:cNvPicPr>
+            <a:picLocks noChangeAspect="1"/>
+          </p:cNvPicPr>
+          <p:nvPr/>
+        </p:nvPicPr>
+        <p:blipFill>
+          <a:blip r:embed="rId26">
+            <a:extLst>
+              <a:ext uri="{28A0092B-C50C-407E-A947-70E740481C1C}">
+                <a14:useLocalDpi xmlns:a14="http://schemas.microsoft.com/office/drawing/2010/main" val="0"/>
+              </a:ext>
+              <a:ext uri="{96DAC541-7B7A-43D3-8B79-37D633B846F1}">
+                <asvg:svgBlip xmlns:asvg="http://schemas.microsoft.com/office/drawing/2016/SVG/main" r:embed="rId27"/>
+              </a:ext>
+            </a:extLst>
+          </a:blip>
+          <a:stretch>
+            <a:fillRect/>
+          </a:stretch>
+        </p:blipFill>
+        <p:spPr>
+          <a:xfrm>
+            <a:off x="3567047" y="4590248"/>
+            <a:ext cx="914400" cy="914400"/>
+          </a:xfrm>
+          <a:prstGeom prst="rect">
+            <a:avLst/>
+          </a:prstGeom>
+        </p:spPr>
+      </p:pic>
+      <p:pic>
+        <p:nvPicPr>
+          <p:cNvPr id="20" name="Graphic 19" descr="Folder Search with solid fill">
+            <a:extLst>
+              <a:ext uri="{FF2B5EF4-FFF2-40B4-BE49-F238E27FC236}">
+                <a16:creationId xmlns:a16="http://schemas.microsoft.com/office/drawing/2014/main" id="{515C2AE2-837C-491D-B43A-022A5425B54F}"/>
+              </a:ext>
+            </a:extLst>
+          </p:cNvPr>
+          <p:cNvPicPr>
+            <a:picLocks noChangeAspect="1"/>
+          </p:cNvPicPr>
+          <p:nvPr/>
+        </p:nvPicPr>
+        <p:blipFill>
+          <a:blip r:embed="rId28">
+            <a:extLst>
+              <a:ext uri="{28A0092B-C50C-407E-A947-70E740481C1C}">
+                <a14:useLocalDpi xmlns:a14="http://schemas.microsoft.com/office/drawing/2010/main" val="0"/>
+              </a:ext>
+              <a:ext uri="{96DAC541-7B7A-43D3-8B79-37D633B846F1}">
+                <asvg:svgBlip xmlns:asvg="http://schemas.microsoft.com/office/drawing/2016/SVG/main" r:embed="rId29"/>
+              </a:ext>
+            </a:extLst>
+          </a:blip>
+          <a:stretch>
+            <a:fillRect/>
+          </a:stretch>
+        </p:blipFill>
+        <p:spPr>
+          <a:xfrm>
+            <a:off x="3567047" y="5504648"/>
+            <a:ext cx="914400" cy="914400"/>
+          </a:xfrm>
+          <a:prstGeom prst="rect">
+            <a:avLst/>
+          </a:prstGeom>
+        </p:spPr>
+      </p:pic>
+      <p:pic>
+        <p:nvPicPr>
+          <p:cNvPr id="22" name="Graphic 21" descr="Open folder with solid fill">
+            <a:extLst>
+              <a:ext uri="{FF2B5EF4-FFF2-40B4-BE49-F238E27FC236}">
+                <a16:creationId xmlns:a16="http://schemas.microsoft.com/office/drawing/2014/main" id="{4F27FB9C-7E99-442C-B923-1597BFCD2583}"/>
+              </a:ext>
+            </a:extLst>
+          </p:cNvPr>
+          <p:cNvPicPr>
+            <a:picLocks noChangeAspect="1"/>
+          </p:cNvPicPr>
+          <p:nvPr/>
+        </p:nvPicPr>
+        <p:blipFill>
+          <a:blip r:embed="rId30">
+            <a:extLst>
+              <a:ext uri="{28A0092B-C50C-407E-A947-70E740481C1C}">
+                <a14:useLocalDpi xmlns:a14="http://schemas.microsoft.com/office/drawing/2010/main" val="0"/>
+              </a:ext>
+              <a:ext uri="{96DAC541-7B7A-43D3-8B79-37D633B846F1}">
+                <asvg:svgBlip xmlns:asvg="http://schemas.microsoft.com/office/drawing/2016/SVG/main" r:embed="rId31"/>
+              </a:ext>
+            </a:extLst>
+          </a:blip>
+          <a:stretch>
+            <a:fillRect/>
+          </a:stretch>
+        </p:blipFill>
+        <p:spPr>
+          <a:xfrm>
+            <a:off x="5395847" y="4590248"/>
+            <a:ext cx="914400" cy="914400"/>
+          </a:xfrm>
+          <a:prstGeom prst="rect">
+            <a:avLst/>
+          </a:prstGeom>
+        </p:spPr>
+      </p:pic>
+      <p:pic>
+        <p:nvPicPr>
+          <p:cNvPr id="24" name="Graphic 23" descr="Folder with solid fill">
+            <a:extLst>
+              <a:ext uri="{FF2B5EF4-FFF2-40B4-BE49-F238E27FC236}">
+                <a16:creationId xmlns:a16="http://schemas.microsoft.com/office/drawing/2014/main" id="{E6E08898-6990-48D4-A609-FBBC5B49314A}"/>
+              </a:ext>
+            </a:extLst>
+          </p:cNvPr>
+          <p:cNvPicPr>
+            <a:picLocks noChangeAspect="1"/>
+          </p:cNvPicPr>
+          <p:nvPr/>
+        </p:nvPicPr>
+        <p:blipFill>
+          <a:blip r:embed="rId32">
+            <a:extLst>
+              <a:ext uri="{28A0092B-C50C-407E-A947-70E740481C1C}">
+                <a14:useLocalDpi xmlns:a14="http://schemas.microsoft.com/office/drawing/2010/main" val="0"/>
+              </a:ext>
+              <a:ext uri="{96DAC541-7B7A-43D3-8B79-37D633B846F1}">
+                <asvg:svgBlip xmlns:asvg="http://schemas.microsoft.com/office/drawing/2016/SVG/main" r:embed="rId33"/>
+              </a:ext>
+            </a:extLst>
+          </a:blip>
+          <a:stretch>
+            <a:fillRect/>
+          </a:stretch>
+        </p:blipFill>
+        <p:spPr>
+          <a:xfrm>
+            <a:off x="4481447" y="4590248"/>
+            <a:ext cx="914400" cy="914400"/>
+          </a:xfrm>
+          <a:prstGeom prst="rect">
+            <a:avLst/>
+          </a:prstGeom>
+        </p:spPr>
+      </p:pic>
+      <p:pic>
+        <p:nvPicPr>
+          <p:cNvPr id="25" name="Graphic 24" descr="Folder with solid fill">
+            <a:extLst>
+              <a:ext uri="{FF2B5EF4-FFF2-40B4-BE49-F238E27FC236}">
+                <a16:creationId xmlns:a16="http://schemas.microsoft.com/office/drawing/2014/main" id="{DB21B0C3-7AB6-458D-9F69-3B5B352445D8}"/>
+              </a:ext>
+            </a:extLst>
+          </p:cNvPr>
+          <p:cNvPicPr>
+            <a:picLocks noChangeAspect="1"/>
+          </p:cNvPicPr>
+          <p:nvPr/>
+        </p:nvPicPr>
+        <p:blipFill>
+          <a:blip r:embed="rId34">
+            <a:extLst>
+              <a:ext uri="{28A0092B-C50C-407E-A947-70E740481C1C}">
+                <a14:useLocalDpi xmlns:a14="http://schemas.microsoft.com/office/drawing/2010/main" val="0"/>
+              </a:ext>
+              <a:ext uri="{96DAC541-7B7A-43D3-8B79-37D633B846F1}">
+                <asvg:svgBlip xmlns:asvg="http://schemas.microsoft.com/office/drawing/2016/SVG/main" r:embed="rId35"/>
+              </a:ext>
+            </a:extLst>
+          </a:blip>
+          <a:stretch>
+            <a:fillRect/>
+          </a:stretch>
+        </p:blipFill>
+        <p:spPr>
+          <a:xfrm>
+            <a:off x="4481447" y="5504648"/>
+            <a:ext cx="914400" cy="914400"/>
+          </a:xfrm>
+          <a:prstGeom prst="rect">
+            <a:avLst/>
+          </a:prstGeom>
+        </p:spPr>
+      </p:pic>
+      <p:pic>
+        <p:nvPicPr>
+          <p:cNvPr id="26" name="Graphic 25" descr="Open folder with solid fill">
+            <a:extLst>
+              <a:ext uri="{FF2B5EF4-FFF2-40B4-BE49-F238E27FC236}">
+                <a16:creationId xmlns:a16="http://schemas.microsoft.com/office/drawing/2014/main" id="{F71A171E-EBA0-4FCF-A6FC-42ECDF32212C}"/>
+              </a:ext>
+            </a:extLst>
+          </p:cNvPr>
+          <p:cNvPicPr>
+            <a:picLocks noChangeAspect="1"/>
+          </p:cNvPicPr>
+          <p:nvPr/>
+        </p:nvPicPr>
+        <p:blipFill>
+          <a:blip r:embed="rId36">
+            <a:extLst>
+              <a:ext uri="{28A0092B-C50C-407E-A947-70E740481C1C}">
+                <a14:useLocalDpi xmlns:a14="http://schemas.microsoft.com/office/drawing/2010/main" val="0"/>
+              </a:ext>
+              <a:ext uri="{96DAC541-7B7A-43D3-8B79-37D633B846F1}">
+                <asvg:svgBlip xmlns:asvg="http://schemas.microsoft.com/office/drawing/2016/SVG/main" r:embed="rId37"/>
+              </a:ext>
+            </a:extLst>
+          </a:blip>
+          <a:stretch>
+            <a:fillRect/>
+          </a:stretch>
+        </p:blipFill>
+        <p:spPr>
+          <a:xfrm>
+            <a:off x="5395847" y="5504648"/>
+            <a:ext cx="914400" cy="914400"/>
+          </a:xfrm>
+          <a:prstGeom prst="rect">
+            <a:avLst/>
+          </a:prstGeom>
+        </p:spPr>
+      </p:pic>
+      <p:pic>
+        <p:nvPicPr>
+          <p:cNvPr id="27" name="Graphic 26" descr="Open folder with solid fill">
+            <a:extLst>
+              <a:ext uri="{FF2B5EF4-FFF2-40B4-BE49-F238E27FC236}">
+                <a16:creationId xmlns:a16="http://schemas.microsoft.com/office/drawing/2014/main" id="{8EE55547-70E8-42E8-8EBC-79E625B53DB7}"/>
+              </a:ext>
+            </a:extLst>
+          </p:cNvPr>
+          <p:cNvPicPr>
+            <a:picLocks noChangeAspect="1"/>
+          </p:cNvPicPr>
+          <p:nvPr/>
+        </p:nvPicPr>
+        <p:blipFill>
+          <a:blip r:embed="rId30">
+            <a:extLst>
+              <a:ext uri="{28A0092B-C50C-407E-A947-70E740481C1C}">
+                <a14:useLocalDpi xmlns:a14="http://schemas.microsoft.com/office/drawing/2010/main" val="0"/>
+              </a:ext>
+              <a:ext uri="{96DAC541-7B7A-43D3-8B79-37D633B846F1}">
+                <asvg:svgBlip xmlns:asvg="http://schemas.microsoft.com/office/drawing/2016/SVG/main" r:embed="rId31"/>
+              </a:ext>
+            </a:extLst>
+          </a:blip>
+          <a:stretch>
+            <a:fillRect/>
+          </a:stretch>
+        </p:blipFill>
+        <p:spPr>
+          <a:xfrm>
+            <a:off x="4298567" y="896153"/>
+            <a:ext cx="914400" cy="914400"/>
+          </a:xfrm>
+          <a:prstGeom prst="rect">
+            <a:avLst/>
+          </a:prstGeom>
+        </p:spPr>
+      </p:pic>
+      <p:pic>
+        <p:nvPicPr>
+          <p:cNvPr id="28" name="Graphic 27" descr="Open folder with solid fill">
+            <a:extLst>
+              <a:ext uri="{FF2B5EF4-FFF2-40B4-BE49-F238E27FC236}">
+                <a16:creationId xmlns:a16="http://schemas.microsoft.com/office/drawing/2014/main" id="{5605A968-EB67-4157-AFA7-6CB3D5B33BF3}"/>
+              </a:ext>
+            </a:extLst>
+          </p:cNvPr>
+          <p:cNvPicPr>
+            <a:picLocks noChangeAspect="1"/>
+          </p:cNvPicPr>
+          <p:nvPr/>
+        </p:nvPicPr>
+        <p:blipFill>
+          <a:blip r:embed="rId36">
+            <a:extLst>
+              <a:ext uri="{28A0092B-C50C-407E-A947-70E740481C1C}">
+                <a14:useLocalDpi xmlns:a14="http://schemas.microsoft.com/office/drawing/2010/main" val="0"/>
+              </a:ext>
+              <a:ext uri="{96DAC541-7B7A-43D3-8B79-37D633B846F1}">
+                <asvg:svgBlip xmlns:asvg="http://schemas.microsoft.com/office/drawing/2016/SVG/main" r:embed="rId37"/>
+              </a:ext>
+            </a:extLst>
+          </a:blip>
+          <a:stretch>
+            <a:fillRect/>
+          </a:stretch>
+        </p:blipFill>
+        <p:spPr>
+          <a:xfrm>
+            <a:off x="4298567" y="1810553"/>
+            <a:ext cx="914400" cy="914400"/>
+          </a:xfrm>
+          <a:prstGeom prst="rect">
+            <a:avLst/>
+          </a:prstGeom>
+        </p:spPr>
+      </p:pic>
+      <p:pic>
+        <p:nvPicPr>
+          <p:cNvPr id="30" name="Graphic 29" descr="Label with solid fill">
+            <a:extLst>
+              <a:ext uri="{FF2B5EF4-FFF2-40B4-BE49-F238E27FC236}">
+                <a16:creationId xmlns:a16="http://schemas.microsoft.com/office/drawing/2014/main" id="{E8286781-1660-4B98-BBF0-7516BD8FD732}"/>
+              </a:ext>
+            </a:extLst>
+          </p:cNvPr>
+          <p:cNvPicPr>
+            <a:picLocks noChangeAspect="1"/>
+          </p:cNvPicPr>
+          <p:nvPr/>
+        </p:nvPicPr>
+        <p:blipFill>
+          <a:blip r:embed="rId38">
+            <a:extLst>
+              <a:ext uri="{28A0092B-C50C-407E-A947-70E740481C1C}">
+                <a14:useLocalDpi xmlns:a14="http://schemas.microsoft.com/office/drawing/2010/main" val="0"/>
+              </a:ext>
+              <a:ext uri="{96DAC541-7B7A-43D3-8B79-37D633B846F1}">
+                <asvg:svgBlip xmlns:asvg="http://schemas.microsoft.com/office/drawing/2016/SVG/main" r:embed="rId39"/>
+              </a:ext>
+            </a:extLst>
+          </a:blip>
+          <a:stretch>
+            <a:fillRect/>
+          </a:stretch>
+        </p:blipFill>
+        <p:spPr>
+          <a:xfrm>
+            <a:off x="5212967" y="896153"/>
+            <a:ext cx="914400" cy="914400"/>
+          </a:xfrm>
+          <a:prstGeom prst="rect">
+            <a:avLst/>
+          </a:prstGeom>
+        </p:spPr>
+      </p:pic>
+      <p:pic>
+        <p:nvPicPr>
+          <p:cNvPr id="32" name="Graphic 31" descr="Open envelope with solid fill">
+            <a:extLst>
+              <a:ext uri="{FF2B5EF4-FFF2-40B4-BE49-F238E27FC236}">
+                <a16:creationId xmlns:a16="http://schemas.microsoft.com/office/drawing/2014/main" id="{2566D6CF-E382-4E9D-BDC0-B0B6EC91D97B}"/>
+              </a:ext>
+            </a:extLst>
+          </p:cNvPr>
+          <p:cNvPicPr>
+            <a:picLocks noChangeAspect="1"/>
+          </p:cNvPicPr>
+          <p:nvPr/>
+        </p:nvPicPr>
+        <p:blipFill>
+          <a:blip r:embed="rId40">
+            <a:extLst>
+              <a:ext uri="{28A0092B-C50C-407E-A947-70E740481C1C}">
+                <a14:useLocalDpi xmlns:a14="http://schemas.microsoft.com/office/drawing/2010/main" val="0"/>
+              </a:ext>
+              <a:ext uri="{96DAC541-7B7A-43D3-8B79-37D633B846F1}">
+                <asvg:svgBlip xmlns:asvg="http://schemas.microsoft.com/office/drawing/2016/SVG/main" r:embed="rId41"/>
+              </a:ext>
+            </a:extLst>
+          </a:blip>
+          <a:stretch>
+            <a:fillRect/>
+          </a:stretch>
+        </p:blipFill>
+        <p:spPr>
+          <a:xfrm>
+            <a:off x="9753693" y="3122674"/>
+            <a:ext cx="914400" cy="914400"/>
+          </a:xfrm>
+          <a:prstGeom prst="rect">
+            <a:avLst/>
+          </a:prstGeom>
+        </p:spPr>
+      </p:pic>
+      <p:pic>
+        <p:nvPicPr>
+          <p:cNvPr id="34" name="Graphic 33" descr="Open envelope outline">
+            <a:extLst>
+              <a:ext uri="{FF2B5EF4-FFF2-40B4-BE49-F238E27FC236}">
+                <a16:creationId xmlns:a16="http://schemas.microsoft.com/office/drawing/2014/main" id="{D5A8AF21-658F-48D0-9CC8-96F80286C9CF}"/>
+              </a:ext>
+            </a:extLst>
+          </p:cNvPr>
+          <p:cNvPicPr>
+            <a:picLocks noChangeAspect="1"/>
+          </p:cNvPicPr>
+          <p:nvPr/>
+        </p:nvPicPr>
+        <p:blipFill>
+          <a:blip r:embed="rId42">
+            <a:extLst>
+              <a:ext uri="{28A0092B-C50C-407E-A947-70E740481C1C}">
+                <a14:useLocalDpi xmlns:a14="http://schemas.microsoft.com/office/drawing/2010/main" val="0"/>
+              </a:ext>
+              <a:ext uri="{96DAC541-7B7A-43D3-8B79-37D633B846F1}">
+                <asvg:svgBlip xmlns:asvg="http://schemas.microsoft.com/office/drawing/2016/SVG/main" r:embed="rId43"/>
+              </a:ext>
+            </a:extLst>
+          </a:blip>
+          <a:stretch>
+            <a:fillRect/>
+          </a:stretch>
+        </p:blipFill>
+        <p:spPr>
+          <a:xfrm>
+            <a:off x="10179433" y="2267753"/>
+            <a:ext cx="914400" cy="914400"/>
+          </a:xfrm>
+          <a:prstGeom prst="rect">
+            <a:avLst/>
+          </a:prstGeom>
+        </p:spPr>
+      </p:pic>
+      <p:pic>
+        <p:nvPicPr>
+          <p:cNvPr id="35" name="Graphic 34" descr="Label with solid fill">
+            <a:extLst>
+              <a:ext uri="{FF2B5EF4-FFF2-40B4-BE49-F238E27FC236}">
+                <a16:creationId xmlns:a16="http://schemas.microsoft.com/office/drawing/2014/main" id="{F810C763-D558-4520-84A1-0598AC9FC713}"/>
+              </a:ext>
+            </a:extLst>
+          </p:cNvPr>
+          <p:cNvPicPr>
+            <a:picLocks noChangeAspect="1"/>
+          </p:cNvPicPr>
+          <p:nvPr/>
+        </p:nvPicPr>
+        <p:blipFill>
+          <a:blip r:embed="rId44">
+            <a:extLst>
+              <a:ext uri="{28A0092B-C50C-407E-A947-70E740481C1C}">
+                <a14:useLocalDpi xmlns:a14="http://schemas.microsoft.com/office/drawing/2010/main" val="0"/>
+              </a:ext>
+              <a:ext uri="{96DAC541-7B7A-43D3-8B79-37D633B846F1}">
+                <asvg:svgBlip xmlns:asvg="http://schemas.microsoft.com/office/drawing/2016/SVG/main" r:embed="rId45"/>
+              </a:ext>
+            </a:extLst>
+          </a:blip>
+          <a:stretch>
+            <a:fillRect/>
+          </a:stretch>
+        </p:blipFill>
+        <p:spPr>
+          <a:xfrm>
+            <a:off x="5212967" y="1810552"/>
+            <a:ext cx="914400" cy="914400"/>
+          </a:xfrm>
+          <a:prstGeom prst="rect">
+            <a:avLst/>
+          </a:prstGeom>
+        </p:spPr>
+      </p:pic>
     </p:spTree>
     <p:extLst>
       <p:ext uri="{BB962C8B-B14F-4D97-AF65-F5344CB8AC3E}">

</xml_diff>